<commit_message>
change order of session 3
</commit_message>
<xml_diff>
--- a/week-1/W1-S1-github-vscode/W1-S1-github-vscode.pptx
+++ b/week-1/W1-S1-github-vscode/W1-S1-github-vscode.pptx
@@ -625,7 +625,7 @@
           <a:p>
             <a:fld id="{F6FA2B21-3FCD-4721-B95C-427943F61125}" type="datetime1">
               <a:rPr lang="en-US" smtClean="0"/>
-              <a:t>9/9/24</a:t>
+              <a:t>9/16/24</a:t>
             </a:fld>
             <a:endParaRPr lang="en-US"/>
           </a:p>
@@ -888,7 +888,7 @@
           <a:p>
             <a:fld id="{F6FA2B21-3FCD-4721-B95C-427943F61125}" type="datetime1">
               <a:rPr lang="en-US" smtClean="0"/>
-              <a:t>9/9/24</a:t>
+              <a:t>9/16/24</a:t>
             </a:fld>
             <a:endParaRPr lang="en-US"/>
           </a:p>
@@ -1124,7 +1124,7 @@
           <a:p>
             <a:fld id="{F6FA2B21-3FCD-4721-B95C-427943F61125}" type="datetime1">
               <a:rPr lang="en-US" smtClean="0"/>
-              <a:t>9/9/24</a:t>
+              <a:t>9/16/24</a:t>
             </a:fld>
             <a:endParaRPr lang="en-US"/>
           </a:p>
@@ -1452,7 +1452,7 @@
           <a:p>
             <a:fld id="{EA0C0817-A112-4847-8014-A94B7D2A4EA3}" type="datetime1">
               <a:rPr lang="en-US" smtClean="0"/>
-              <a:t>9/9/24</a:t>
+              <a:t>9/16/24</a:t>
             </a:fld>
             <a:endParaRPr lang="en-US" dirty="0"/>
           </a:p>
@@ -1766,7 +1766,7 @@
           <a:p>
             <a:fld id="{7332B432-ACDA-4023-A761-2BAB76577B62}" type="datetime1">
               <a:rPr lang="en-US" smtClean="0"/>
-              <a:t>9/9/24</a:t>
+              <a:t>9/16/24</a:t>
             </a:fld>
             <a:endParaRPr lang="en-US"/>
           </a:p>
@@ -2073,7 +2073,7 @@
           <a:p>
             <a:fld id="{D9C646AA-F36E-4540-911D-FFFC0A0EF24A}" type="datetime1">
               <a:rPr lang="en-US" smtClean="0"/>
-              <a:t>9/9/24</a:t>
+              <a:t>9/16/24</a:t>
             </a:fld>
             <a:endParaRPr lang="en-US" dirty="0"/>
           </a:p>
@@ -2375,7 +2375,7 @@
           <a:p>
             <a:fld id="{69186D26-FA5F-4637-B602-B7C2DC34CFD4}" type="datetime1">
               <a:rPr lang="en-US" smtClean="0"/>
-              <a:t>9/9/24</a:t>
+              <a:t>9/16/24</a:t>
             </a:fld>
             <a:endParaRPr lang="en-US"/>
           </a:p>
@@ -2797,7 +2797,7 @@
           <a:p>
             <a:fld id="{8A7F15D8-96D1-4781-BC50-CA8A088B2FE4}" type="datetime1">
               <a:rPr lang="en-US" smtClean="0"/>
-              <a:t>9/9/24</a:t>
+              <a:t>9/16/24</a:t>
             </a:fld>
             <a:endParaRPr lang="en-US"/>
           </a:p>
@@ -2959,7 +2959,7 @@
           <a:p>
             <a:fld id="{F9A96C99-B8F8-4528-BD05-0E16E943DC09}" type="datetime1">
               <a:rPr lang="en-US" smtClean="0"/>
-              <a:t>9/9/24</a:t>
+              <a:t>9/16/24</a:t>
             </a:fld>
             <a:endParaRPr lang="en-US"/>
           </a:p>
@@ -3054,7 +3054,7 @@
           <a:p>
             <a:fld id="{03636942-C211-4B28-8DBD-C953E00AF71B}" type="datetime1">
               <a:rPr lang="en-US" smtClean="0"/>
-              <a:t>9/9/24</a:t>
+              <a:t>9/16/24</a:t>
             </a:fld>
             <a:endParaRPr lang="en-US"/>
           </a:p>
@@ -3432,7 +3432,7 @@
           <a:p>
             <a:fld id="{7E8D12A6-918A-48BD-8CB9-CA713993B0EA}" type="datetime1">
               <a:rPr lang="en-US" smtClean="0"/>
-              <a:t>9/9/24</a:t>
+              <a:t>9/16/24</a:t>
             </a:fld>
             <a:endParaRPr lang="en-US"/>
           </a:p>
@@ -3721,7 +3721,7 @@
           <a:p>
             <a:fld id="{F6FA2B21-3FCD-4721-B95C-427943F61125}" type="datetime1">
               <a:rPr lang="en-US" smtClean="0"/>
-              <a:t>9/9/24</a:t>
+              <a:t>9/16/24</a:t>
             </a:fld>
             <a:endParaRPr lang="en-US"/>
           </a:p>
@@ -3933,7 +3933,7 @@
           <a:p>
             <a:fld id="{F6FA2B21-3FCD-4721-B95C-427943F61125}" type="datetime1">
               <a:rPr lang="en-US" smtClean="0"/>
-              <a:t>9/9/24</a:t>
+              <a:t>9/16/24</a:t>
             </a:fld>
             <a:endParaRPr lang="en-US"/>
           </a:p>
@@ -5355,6 +5355,16 @@
               <a:rPr lang="en-GB" dirty="0"/>
               <a:t>Add content, commit, and push.</a:t>
             </a:r>
+            <a:br>
+              <a:rPr lang="en-GB" dirty="0"/>
+            </a:br>
+            <a:br>
+              <a:rPr lang="en-GB" dirty="0"/>
+            </a:br>
+            <a:r>
+              <a:rPr lang="en-GB" dirty="0"/>
+              <a:t>Demo…</a:t>
+            </a:r>
           </a:p>
         </p:txBody>
       </p:sp>
@@ -7121,6 +7131,16 @@
             <a:r>
               <a:rPr lang="en-GB" dirty="0"/>
               <a:t>Verify the file was created: ls</a:t>
+            </a:r>
+            <a:br>
+              <a:rPr lang="en-GB" dirty="0"/>
+            </a:br>
+            <a:br>
+              <a:rPr lang="en-GB" dirty="0"/>
+            </a:br>
+            <a:r>
+              <a:rPr lang="en-GB" dirty="0"/>
+              <a:t>demo….</a:t>
             </a:r>
           </a:p>
         </p:txBody>

</xml_diff>